<commit_message>
Presentation de Git version1
</commit_message>
<xml_diff>
--- a/Pres-Git.pptx
+++ b/Pres-Git.pptx
@@ -1803,1483 +1803,6 @@
       <dsp:cNvGrpSpPr/>
     </dsp:nvGrpSpPr>
     <dsp:grpSpPr/>
-    <dsp:sp modelId="{456F0EC7-D38B-4EB2-B06C-273DD41EFEE7}">
-      <dsp:nvSpPr>
-        <dsp:cNvPr id="0" name=""/>
-        <dsp:cNvSpPr/>
-      </dsp:nvSpPr>
-      <dsp:spPr>
-        <a:xfrm>
-          <a:off x="3613546" y="2134887"/>
-          <a:ext cx="969362" cy="969362"/>
-        </a:xfrm>
-        <a:prstGeom prst="ellipse">
-          <a:avLst/>
-        </a:prstGeom>
-        <a:solidFill>
-          <a:schemeClr val="accent1">
-            <a:hueOff val="0"/>
-            <a:satOff val="0"/>
-            <a:lumOff val="0"/>
-            <a:alphaOff val="0"/>
-          </a:schemeClr>
-        </a:solidFill>
-        <a:ln w="12700" cap="flat" cmpd="sng" algn="ctr">
-          <a:solidFill>
-            <a:schemeClr val="lt1">
-              <a:hueOff val="0"/>
-              <a:satOff val="0"/>
-              <a:lumOff val="0"/>
-              <a:alphaOff val="0"/>
-            </a:schemeClr>
-          </a:solidFill>
-          <a:prstDash val="solid"/>
-          <a:miter lim="800000"/>
-        </a:ln>
-        <a:effectLst/>
-      </dsp:spPr>
-      <dsp:style>
-        <a:lnRef idx="2">
-          <a:scrgbClr r="0" g="0" b="0"/>
-        </a:lnRef>
-        <a:fillRef idx="1">
-          <a:scrgbClr r="0" g="0" b="0"/>
-        </a:fillRef>
-        <a:effectRef idx="0">
-          <a:scrgbClr r="0" g="0" b="0"/>
-        </a:effectRef>
-        <a:fontRef idx="minor">
-          <a:schemeClr val="lt1"/>
-        </a:fontRef>
-      </dsp:style>
-      <dsp:txBody>
-        <a:bodyPr spcFirstLastPara="0" vert="horz" wrap="square" lIns="20320" tIns="20320" rIns="20320" bIns="20320" numCol="1" spcCol="1270" anchor="ctr" anchorCtr="0">
-          <a:noAutofit/>
-        </a:bodyPr>
-        <a:lstStyle/>
-        <a:p>
-          <a:pPr lvl="0" algn="ctr" defTabSz="711200">
-            <a:lnSpc>
-              <a:spcPct val="90000"/>
-            </a:lnSpc>
-            <a:spcBef>
-              <a:spcPct val="0"/>
-            </a:spcBef>
-            <a:spcAft>
-              <a:spcPct val="35000"/>
-            </a:spcAft>
-          </a:pPr>
-          <a:r>
-            <a:rPr lang="fr-FR" sz="1600" b="1" kern="1200" dirty="0" smtClean="0">
-              <a:solidFill>
-                <a:schemeClr val="dk1"/>
-              </a:solidFill>
-              <a:latin typeface="MV Boli" panose="02000500030200090000" pitchFamily="2" charset="0"/>
-              <a:cs typeface="MV Boli" panose="02000500030200090000" pitchFamily="2" charset="0"/>
-            </a:rPr>
-            <a:t>Agile </a:t>
-          </a:r>
-          <a:r>
-            <a:rPr lang="fr-FR" sz="1600" b="1" kern="1200" dirty="0" err="1" smtClean="0">
-              <a:solidFill>
-                <a:schemeClr val="dk1"/>
-              </a:solidFill>
-              <a:latin typeface="MV Boli" panose="02000500030200090000" pitchFamily="2" charset="0"/>
-              <a:cs typeface="MV Boli" panose="02000500030200090000" pitchFamily="2" charset="0"/>
-            </a:rPr>
-            <a:t>Scrum</a:t>
-          </a:r>
-          <a:endParaRPr lang="fr-FR" sz="1600" b="1" kern="1200" dirty="0">
-            <a:solidFill>
-              <a:schemeClr val="dk1"/>
-            </a:solidFill>
-            <a:latin typeface="MV Boli" panose="02000500030200090000" pitchFamily="2" charset="0"/>
-            <a:cs typeface="MV Boli" panose="02000500030200090000" pitchFamily="2" charset="0"/>
-          </a:endParaRPr>
-        </a:p>
-      </dsp:txBody>
-      <dsp:txXfrm>
-        <a:off x="3755506" y="2276847"/>
-        <a:ext cx="685442" cy="685442"/>
-      </dsp:txXfrm>
-    </dsp:sp>
-    <dsp:sp modelId="{02BC0F5B-95DD-4E15-AA28-C6D736E9B85B}">
-      <dsp:nvSpPr>
-        <dsp:cNvPr id="0" name=""/>
-        <dsp:cNvSpPr/>
-      </dsp:nvSpPr>
-      <dsp:spPr>
-        <a:xfrm rot="16200000">
-          <a:off x="3856877" y="1463313"/>
-          <a:ext cx="482701" cy="459712"/>
-        </a:xfrm>
-        <a:prstGeom prst="rightArrow">
-          <a:avLst>
-            <a:gd name="adj1" fmla="val 60000"/>
-            <a:gd name="adj2" fmla="val 50000"/>
-          </a:avLst>
-        </a:prstGeom>
-        <a:solidFill>
-          <a:schemeClr val="accent1">
-            <a:tint val="60000"/>
-            <a:hueOff val="0"/>
-            <a:satOff val="0"/>
-            <a:lumOff val="0"/>
-            <a:alphaOff val="0"/>
-          </a:schemeClr>
-        </a:solidFill>
-        <a:ln>
-          <a:noFill/>
-        </a:ln>
-        <a:effectLst/>
-      </dsp:spPr>
-      <dsp:style>
-        <a:lnRef idx="0">
-          <a:scrgbClr r="0" g="0" b="0"/>
-        </a:lnRef>
-        <a:fillRef idx="1">
-          <a:scrgbClr r="0" g="0" b="0"/>
-        </a:fillRef>
-        <a:effectRef idx="0">
-          <a:scrgbClr r="0" g="0" b="0"/>
-        </a:effectRef>
-        <a:fontRef idx="minor">
-          <a:schemeClr val="lt1"/>
-        </a:fontRef>
-      </dsp:style>
-      <dsp:txBody>
-        <a:bodyPr spcFirstLastPara="0" vert="horz" wrap="square" lIns="0" tIns="0" rIns="0" bIns="0" numCol="1" spcCol="1270" anchor="ctr" anchorCtr="0">
-          <a:noAutofit/>
-        </a:bodyPr>
-        <a:lstStyle/>
-        <a:p>
-          <a:pPr lvl="0" algn="ctr" defTabSz="844550">
-            <a:lnSpc>
-              <a:spcPct val="90000"/>
-            </a:lnSpc>
-            <a:spcBef>
-              <a:spcPct val="0"/>
-            </a:spcBef>
-            <a:spcAft>
-              <a:spcPct val="35000"/>
-            </a:spcAft>
-          </a:pPr>
-          <a:endParaRPr lang="fr-FR" sz="1900" kern="1200"/>
-        </a:p>
-      </dsp:txBody>
-      <dsp:txXfrm>
-        <a:off x="3925834" y="1624212"/>
-        <a:ext cx="344787" cy="275828"/>
-      </dsp:txXfrm>
-    </dsp:sp>
-    <dsp:sp modelId="{3D09945F-D444-4D59-85BA-88243068F63B}">
-      <dsp:nvSpPr>
-        <dsp:cNvPr id="0" name=""/>
-        <dsp:cNvSpPr/>
-      </dsp:nvSpPr>
-      <dsp:spPr>
-        <a:xfrm>
-          <a:off x="3557390" y="142454"/>
-          <a:ext cx="1081675" cy="1081675"/>
-        </a:xfrm>
-        <a:prstGeom prst="ellipse">
-          <a:avLst/>
-        </a:prstGeom>
-        <a:solidFill>
-          <a:schemeClr val="accent1">
-            <a:hueOff val="0"/>
-            <a:satOff val="0"/>
-            <a:lumOff val="0"/>
-            <a:alphaOff val="0"/>
-          </a:schemeClr>
-        </a:solidFill>
-        <a:ln w="12700" cap="flat" cmpd="sng" algn="ctr">
-          <a:solidFill>
-            <a:schemeClr val="lt1">
-              <a:hueOff val="0"/>
-              <a:satOff val="0"/>
-              <a:lumOff val="0"/>
-              <a:alphaOff val="0"/>
-            </a:schemeClr>
-          </a:solidFill>
-          <a:prstDash val="solid"/>
-          <a:miter lim="800000"/>
-        </a:ln>
-        <a:effectLst/>
-      </dsp:spPr>
-      <dsp:style>
-        <a:lnRef idx="2">
-          <a:scrgbClr r="0" g="0" b="0"/>
-        </a:lnRef>
-        <a:fillRef idx="1">
-          <a:scrgbClr r="0" g="0" b="0"/>
-        </a:fillRef>
-        <a:effectRef idx="0">
-          <a:scrgbClr r="0" g="0" b="0"/>
-        </a:effectRef>
-        <a:fontRef idx="minor">
-          <a:schemeClr val="lt1"/>
-        </a:fontRef>
-      </dsp:style>
-      <dsp:txBody>
-        <a:bodyPr spcFirstLastPara="0" vert="horz" wrap="square" lIns="13970" tIns="13970" rIns="13970" bIns="13970" numCol="1" spcCol="1270" anchor="ctr" anchorCtr="0">
-          <a:noAutofit/>
-        </a:bodyPr>
-        <a:lstStyle/>
-        <a:p>
-          <a:pPr lvl="0" algn="ctr" defTabSz="488950">
-            <a:lnSpc>
-              <a:spcPct val="90000"/>
-            </a:lnSpc>
-            <a:spcBef>
-              <a:spcPct val="0"/>
-            </a:spcBef>
-            <a:spcAft>
-              <a:spcPct val="35000"/>
-            </a:spcAft>
-          </a:pPr>
-          <a:r>
-            <a:rPr lang="fr-FR" sz="1100" b="1" kern="1200" dirty="0" smtClean="0">
-              <a:solidFill>
-                <a:schemeClr val="dk1"/>
-              </a:solidFill>
-              <a:latin typeface="MV Boli" panose="02000500030200090000" pitchFamily="2" charset="0"/>
-              <a:cs typeface="MV Boli" panose="02000500030200090000" pitchFamily="2" charset="0"/>
-            </a:rPr>
-            <a:t>Itérations courtes de durées fixes</a:t>
-          </a:r>
-          <a:endParaRPr lang="fr-FR" sz="1100" kern="1200" dirty="0"/>
-        </a:p>
-      </dsp:txBody>
-      <dsp:txXfrm>
-        <a:off x="3715798" y="300862"/>
-        <a:ext cx="764859" cy="764859"/>
-      </dsp:txXfrm>
-    </dsp:sp>
-    <dsp:sp modelId="{60D8ED61-C0B4-47A2-A6BC-35E6AF93D196}">
-      <dsp:nvSpPr>
-        <dsp:cNvPr id="0" name=""/>
-        <dsp:cNvSpPr/>
-      </dsp:nvSpPr>
-      <dsp:spPr>
-        <a:xfrm rot="18600000">
-          <a:off x="4456524" y="1646915"/>
-          <a:ext cx="529967" cy="459712"/>
-        </a:xfrm>
-        <a:prstGeom prst="rightArrow">
-          <a:avLst>
-            <a:gd name="adj1" fmla="val 60000"/>
-            <a:gd name="adj2" fmla="val 50000"/>
-          </a:avLst>
-        </a:prstGeom>
-        <a:solidFill>
-          <a:schemeClr val="accent1">
-            <a:tint val="60000"/>
-            <a:hueOff val="0"/>
-            <a:satOff val="0"/>
-            <a:lumOff val="0"/>
-            <a:alphaOff val="0"/>
-          </a:schemeClr>
-        </a:solidFill>
-        <a:ln>
-          <a:noFill/>
-        </a:ln>
-        <a:effectLst/>
-      </dsp:spPr>
-      <dsp:style>
-        <a:lnRef idx="0">
-          <a:scrgbClr r="0" g="0" b="0"/>
-        </a:lnRef>
-        <a:fillRef idx="1">
-          <a:scrgbClr r="0" g="0" b="0"/>
-        </a:fillRef>
-        <a:effectRef idx="0">
-          <a:scrgbClr r="0" g="0" b="0"/>
-        </a:effectRef>
-        <a:fontRef idx="minor">
-          <a:schemeClr val="lt1"/>
-        </a:fontRef>
-      </dsp:style>
-      <dsp:txBody>
-        <a:bodyPr spcFirstLastPara="0" vert="horz" wrap="square" lIns="0" tIns="0" rIns="0" bIns="0" numCol="1" spcCol="1270" anchor="ctr" anchorCtr="0">
-          <a:noAutofit/>
-        </a:bodyPr>
-        <a:lstStyle/>
-        <a:p>
-          <a:pPr lvl="0" algn="ctr" defTabSz="844550">
-            <a:lnSpc>
-              <a:spcPct val="90000"/>
-            </a:lnSpc>
-            <a:spcBef>
-              <a:spcPct val="0"/>
-            </a:spcBef>
-            <a:spcAft>
-              <a:spcPct val="35000"/>
-            </a:spcAft>
-          </a:pPr>
-          <a:endParaRPr lang="fr-FR" sz="1900" kern="1200"/>
-        </a:p>
-      </dsp:txBody>
-      <dsp:txXfrm>
-        <a:off x="4481156" y="1791681"/>
-        <a:ext cx="392053" cy="275828"/>
-      </dsp:txXfrm>
-    </dsp:sp>
-    <dsp:sp modelId="{EFD2F169-F255-4228-BC30-F3BED8400F5D}">
-      <dsp:nvSpPr>
-        <dsp:cNvPr id="0" name=""/>
-        <dsp:cNvSpPr/>
-      </dsp:nvSpPr>
-      <dsp:spPr>
-        <a:xfrm>
-          <a:off x="4789447" y="502221"/>
-          <a:ext cx="1263256" cy="1081675"/>
-        </a:xfrm>
-        <a:prstGeom prst="ellipse">
-          <a:avLst/>
-        </a:prstGeom>
-        <a:solidFill>
-          <a:schemeClr val="accent1">
-            <a:hueOff val="0"/>
-            <a:satOff val="0"/>
-            <a:lumOff val="0"/>
-            <a:alphaOff val="0"/>
-          </a:schemeClr>
-        </a:solidFill>
-        <a:ln w="12700" cap="flat" cmpd="sng" algn="ctr">
-          <a:solidFill>
-            <a:schemeClr val="lt1">
-              <a:hueOff val="0"/>
-              <a:satOff val="0"/>
-              <a:lumOff val="0"/>
-              <a:alphaOff val="0"/>
-            </a:schemeClr>
-          </a:solidFill>
-          <a:prstDash val="solid"/>
-          <a:miter lim="800000"/>
-        </a:ln>
-        <a:effectLst/>
-      </dsp:spPr>
-      <dsp:style>
-        <a:lnRef idx="2">
-          <a:scrgbClr r="0" g="0" b="0"/>
-        </a:lnRef>
-        <a:fillRef idx="1">
-          <a:scrgbClr r="0" g="0" b="0"/>
-        </a:fillRef>
-        <a:effectRef idx="0">
-          <a:scrgbClr r="0" g="0" b="0"/>
-        </a:effectRef>
-        <a:fontRef idx="minor">
-          <a:schemeClr val="lt1"/>
-        </a:fontRef>
-      </dsp:style>
-      <dsp:txBody>
-        <a:bodyPr spcFirstLastPara="0" vert="horz" wrap="square" lIns="13970" tIns="13970" rIns="13970" bIns="13970" numCol="1" spcCol="1270" anchor="ctr" anchorCtr="0">
-          <a:noAutofit/>
-        </a:bodyPr>
-        <a:lstStyle/>
-        <a:p>
-          <a:pPr lvl="0" algn="ctr" defTabSz="488950">
-            <a:lnSpc>
-              <a:spcPct val="90000"/>
-            </a:lnSpc>
-            <a:spcBef>
-              <a:spcPct val="0"/>
-            </a:spcBef>
-            <a:spcAft>
-              <a:spcPct val="35000"/>
-            </a:spcAft>
-          </a:pPr>
-          <a:r>
-            <a:rPr lang="fr-FR" sz="1100" b="1" kern="1200" dirty="0" smtClean="0">
-              <a:solidFill>
-                <a:schemeClr val="dk1"/>
-              </a:solidFill>
-              <a:latin typeface="MV Boli" panose="02000500030200090000" pitchFamily="2" charset="0"/>
-              <a:cs typeface="MV Boli" panose="02000500030200090000" pitchFamily="2" charset="0"/>
-            </a:rPr>
-            <a:t>Amélioration continue </a:t>
-          </a:r>
-          <a:endParaRPr lang="fr-FR" sz="1100" kern="1200" dirty="0"/>
-        </a:p>
-      </dsp:txBody>
-      <dsp:txXfrm>
-        <a:off x="4974447" y="660629"/>
-        <a:ext cx="893256" cy="764859"/>
-      </dsp:txXfrm>
-    </dsp:sp>
-    <dsp:sp modelId="{8C71B3B1-5A54-495B-9955-C8BFC701AD19}">
-      <dsp:nvSpPr>
-        <dsp:cNvPr id="0" name=""/>
-        <dsp:cNvSpPr/>
-      </dsp:nvSpPr>
-      <dsp:spPr>
-        <a:xfrm rot="21000000">
-          <a:off x="4795081" y="2218594"/>
-          <a:ext cx="547207" cy="459712"/>
-        </a:xfrm>
-        <a:prstGeom prst="rightArrow">
-          <a:avLst>
-            <a:gd name="adj1" fmla="val 60000"/>
-            <a:gd name="adj2" fmla="val 50000"/>
-          </a:avLst>
-        </a:prstGeom>
-        <a:solidFill>
-          <a:schemeClr val="accent1">
-            <a:tint val="60000"/>
-            <a:hueOff val="0"/>
-            <a:satOff val="0"/>
-            <a:lumOff val="0"/>
-            <a:alphaOff val="0"/>
-          </a:schemeClr>
-        </a:solidFill>
-        <a:ln>
-          <a:noFill/>
-        </a:ln>
-        <a:effectLst/>
-      </dsp:spPr>
-      <dsp:style>
-        <a:lnRef idx="0">
-          <a:scrgbClr r="0" g="0" b="0"/>
-        </a:lnRef>
-        <a:fillRef idx="1">
-          <a:scrgbClr r="0" g="0" b="0"/>
-        </a:fillRef>
-        <a:effectRef idx="0">
-          <a:scrgbClr r="0" g="0" b="0"/>
-        </a:effectRef>
-        <a:fontRef idx="minor">
-          <a:schemeClr val="lt1"/>
-        </a:fontRef>
-      </dsp:style>
-      <dsp:txBody>
-        <a:bodyPr spcFirstLastPara="0" vert="horz" wrap="square" lIns="0" tIns="0" rIns="0" bIns="0" numCol="1" spcCol="1270" anchor="ctr" anchorCtr="0">
-          <a:noAutofit/>
-        </a:bodyPr>
-        <a:lstStyle/>
-        <a:p>
-          <a:pPr lvl="0" algn="ctr" defTabSz="844550">
-            <a:lnSpc>
-              <a:spcPct val="90000"/>
-            </a:lnSpc>
-            <a:spcBef>
-              <a:spcPct val="0"/>
-            </a:spcBef>
-            <a:spcAft>
-              <a:spcPct val="35000"/>
-            </a:spcAft>
-          </a:pPr>
-          <a:endParaRPr lang="fr-FR" sz="1900" kern="1200"/>
-        </a:p>
-      </dsp:txBody>
-      <dsp:txXfrm>
-        <a:off x="4796129" y="2322510"/>
-        <a:ext cx="409293" cy="275828"/>
-      </dsp:txXfrm>
-    </dsp:sp>
-    <dsp:sp modelId="{C831DBFB-9128-4405-B243-B9FA5798825B}">
-      <dsp:nvSpPr>
-        <dsp:cNvPr id="0" name=""/>
-        <dsp:cNvSpPr/>
-      </dsp:nvSpPr>
-      <dsp:spPr>
-        <a:xfrm>
-          <a:off x="5584110" y="1721365"/>
-          <a:ext cx="1081675" cy="1081675"/>
-        </a:xfrm>
-        <a:prstGeom prst="ellipse">
-          <a:avLst/>
-        </a:prstGeom>
-        <a:solidFill>
-          <a:schemeClr val="accent1">
-            <a:hueOff val="0"/>
-            <a:satOff val="0"/>
-            <a:lumOff val="0"/>
-            <a:alphaOff val="0"/>
-          </a:schemeClr>
-        </a:solidFill>
-        <a:ln w="12700" cap="flat" cmpd="sng" algn="ctr">
-          <a:solidFill>
-            <a:schemeClr val="lt1">
-              <a:hueOff val="0"/>
-              <a:satOff val="0"/>
-              <a:lumOff val="0"/>
-              <a:alphaOff val="0"/>
-            </a:schemeClr>
-          </a:solidFill>
-          <a:prstDash val="solid"/>
-          <a:miter lim="800000"/>
-        </a:ln>
-        <a:effectLst/>
-      </dsp:spPr>
-      <dsp:style>
-        <a:lnRef idx="2">
-          <a:scrgbClr r="0" g="0" b="0"/>
-        </a:lnRef>
-        <a:fillRef idx="1">
-          <a:scrgbClr r="0" g="0" b="0"/>
-        </a:fillRef>
-        <a:effectRef idx="0">
-          <a:scrgbClr r="0" g="0" b="0"/>
-        </a:effectRef>
-        <a:fontRef idx="minor">
-          <a:schemeClr val="lt1"/>
-        </a:fontRef>
-      </dsp:style>
-      <dsp:txBody>
-        <a:bodyPr spcFirstLastPara="0" vert="horz" wrap="square" lIns="13970" tIns="13970" rIns="13970" bIns="13970" numCol="1" spcCol="1270" anchor="ctr" anchorCtr="0">
-          <a:noAutofit/>
-        </a:bodyPr>
-        <a:lstStyle/>
-        <a:p>
-          <a:pPr lvl="0" algn="ctr" defTabSz="488950">
-            <a:lnSpc>
-              <a:spcPct val="90000"/>
-            </a:lnSpc>
-            <a:spcBef>
-              <a:spcPct val="0"/>
-            </a:spcBef>
-            <a:spcAft>
-              <a:spcPct val="35000"/>
-            </a:spcAft>
-          </a:pPr>
-          <a:r>
-            <a:rPr lang="fr-FR" sz="1100" b="1" kern="1200" dirty="0" smtClean="0">
-              <a:solidFill>
-                <a:schemeClr val="dk1"/>
-              </a:solidFill>
-              <a:latin typeface="MV Boli" panose="02000500030200090000" pitchFamily="2" charset="0"/>
-              <a:cs typeface="MV Boli" panose="02000500030200090000" pitchFamily="2" charset="0"/>
-            </a:rPr>
-            <a:t>Définition de rôles</a:t>
-          </a:r>
-          <a:endParaRPr lang="fr-FR" sz="1100" kern="1200" dirty="0"/>
-        </a:p>
-      </dsp:txBody>
-      <dsp:txXfrm>
-        <a:off x="5742518" y="1879773"/>
-        <a:ext cx="764859" cy="764859"/>
-      </dsp:txXfrm>
-    </dsp:sp>
-    <dsp:sp modelId="{90A83CBB-91F0-42F1-BBC1-50B53AA7DA0D}">
-      <dsp:nvSpPr>
-        <dsp:cNvPr id="0" name=""/>
-        <dsp:cNvSpPr/>
-      </dsp:nvSpPr>
-      <dsp:spPr>
-        <a:xfrm rot="1800000">
-          <a:off x="4678029" y="2882426"/>
-          <a:ext cx="547207" cy="459712"/>
-        </a:xfrm>
-        <a:prstGeom prst="rightArrow">
-          <a:avLst>
-            <a:gd name="adj1" fmla="val 60000"/>
-            <a:gd name="adj2" fmla="val 50000"/>
-          </a:avLst>
-        </a:prstGeom>
-        <a:solidFill>
-          <a:schemeClr val="accent1">
-            <a:tint val="60000"/>
-            <a:hueOff val="0"/>
-            <a:satOff val="0"/>
-            <a:lumOff val="0"/>
-            <a:alphaOff val="0"/>
-          </a:schemeClr>
-        </a:solidFill>
-        <a:ln>
-          <a:noFill/>
-        </a:ln>
-        <a:effectLst/>
-      </dsp:spPr>
-      <dsp:style>
-        <a:lnRef idx="0">
-          <a:scrgbClr r="0" g="0" b="0"/>
-        </a:lnRef>
-        <a:fillRef idx="1">
-          <a:scrgbClr r="0" g="0" b="0"/>
-        </a:fillRef>
-        <a:effectRef idx="0">
-          <a:scrgbClr r="0" g="0" b="0"/>
-        </a:effectRef>
-        <a:fontRef idx="minor">
-          <a:schemeClr val="lt1"/>
-        </a:fontRef>
-      </dsp:style>
-      <dsp:txBody>
-        <a:bodyPr spcFirstLastPara="0" vert="horz" wrap="square" lIns="0" tIns="0" rIns="0" bIns="0" numCol="1" spcCol="1270" anchor="ctr" anchorCtr="0">
-          <a:noAutofit/>
-        </a:bodyPr>
-        <a:lstStyle/>
-        <a:p>
-          <a:pPr lvl="0" algn="ctr" defTabSz="844550">
-            <a:lnSpc>
-              <a:spcPct val="90000"/>
-            </a:lnSpc>
-            <a:spcBef>
-              <a:spcPct val="0"/>
-            </a:spcBef>
-            <a:spcAft>
-              <a:spcPct val="35000"/>
-            </a:spcAft>
-          </a:pPr>
-          <a:endParaRPr lang="fr-FR" sz="1900" kern="1200"/>
-        </a:p>
-      </dsp:txBody>
-      <dsp:txXfrm>
-        <a:off x="4687267" y="2939890"/>
-        <a:ext cx="409293" cy="275828"/>
-      </dsp:txXfrm>
-    </dsp:sp>
-    <dsp:sp modelId="{6EA2CF85-8A1A-4019-B484-0806DD593FA0}">
-      <dsp:nvSpPr>
-        <dsp:cNvPr id="0" name=""/>
-        <dsp:cNvSpPr/>
-      </dsp:nvSpPr>
-      <dsp:spPr>
-        <a:xfrm>
-          <a:off x="5339658" y="3107723"/>
-          <a:ext cx="1081675" cy="1081675"/>
-        </a:xfrm>
-        <a:prstGeom prst="ellipse">
-          <a:avLst/>
-        </a:prstGeom>
-        <a:solidFill>
-          <a:schemeClr val="accent1">
-            <a:hueOff val="0"/>
-            <a:satOff val="0"/>
-            <a:lumOff val="0"/>
-            <a:alphaOff val="0"/>
-          </a:schemeClr>
-        </a:solidFill>
-        <a:ln w="12700" cap="flat" cmpd="sng" algn="ctr">
-          <a:solidFill>
-            <a:schemeClr val="lt1">
-              <a:hueOff val="0"/>
-              <a:satOff val="0"/>
-              <a:lumOff val="0"/>
-              <a:alphaOff val="0"/>
-            </a:schemeClr>
-          </a:solidFill>
-          <a:prstDash val="solid"/>
-          <a:miter lim="800000"/>
-        </a:ln>
-        <a:effectLst/>
-      </dsp:spPr>
-      <dsp:style>
-        <a:lnRef idx="2">
-          <a:scrgbClr r="0" g="0" b="0"/>
-        </a:lnRef>
-        <a:fillRef idx="1">
-          <a:scrgbClr r="0" g="0" b="0"/>
-        </a:fillRef>
-        <a:effectRef idx="0">
-          <a:scrgbClr r="0" g="0" b="0"/>
-        </a:effectRef>
-        <a:fontRef idx="minor">
-          <a:schemeClr val="lt1"/>
-        </a:fontRef>
-      </dsp:style>
-      <dsp:txBody>
-        <a:bodyPr spcFirstLastPara="0" vert="horz" wrap="square" lIns="13970" tIns="13970" rIns="13970" bIns="13970" numCol="1" spcCol="1270" anchor="ctr" anchorCtr="0">
-          <a:noAutofit/>
-        </a:bodyPr>
-        <a:lstStyle/>
-        <a:p>
-          <a:pPr lvl="0" algn="ctr" defTabSz="488950">
-            <a:lnSpc>
-              <a:spcPct val="90000"/>
-            </a:lnSpc>
-            <a:spcBef>
-              <a:spcPct val="0"/>
-            </a:spcBef>
-            <a:spcAft>
-              <a:spcPct val="35000"/>
-            </a:spcAft>
-          </a:pPr>
-          <a:r>
-            <a:rPr lang="fr-FR" sz="1100" b="1" kern="1200" dirty="0" smtClean="0">
-              <a:solidFill>
-                <a:schemeClr val="dk1"/>
-              </a:solidFill>
-              <a:latin typeface="MV Boli" panose="02000500030200090000" pitchFamily="2" charset="0"/>
-              <a:cs typeface="MV Boli" panose="02000500030200090000" pitchFamily="2" charset="0"/>
-            </a:rPr>
-            <a:t>Gestion de projet </a:t>
-          </a:r>
-          <a:endParaRPr lang="fr-FR" sz="1100" kern="1200" dirty="0"/>
-        </a:p>
-      </dsp:txBody>
-      <dsp:txXfrm>
-        <a:off x="5498066" y="3266131"/>
-        <a:ext cx="764859" cy="764859"/>
-      </dsp:txXfrm>
-    </dsp:sp>
-    <dsp:sp modelId="{7015046F-831A-4638-AA14-F95C241D8087}">
-      <dsp:nvSpPr>
-        <dsp:cNvPr id="0" name=""/>
-        <dsp:cNvSpPr/>
-      </dsp:nvSpPr>
-      <dsp:spPr>
-        <a:xfrm rot="4050444">
-          <a:off x="4205310" y="3279325"/>
-          <a:ext cx="522545" cy="459712"/>
-        </a:xfrm>
-        <a:prstGeom prst="rightArrow">
-          <a:avLst>
-            <a:gd name="adj1" fmla="val 60000"/>
-            <a:gd name="adj2" fmla="val 50000"/>
-          </a:avLst>
-        </a:prstGeom>
-        <a:solidFill>
-          <a:schemeClr val="accent1">
-            <a:tint val="60000"/>
-            <a:hueOff val="0"/>
-            <a:satOff val="0"/>
-            <a:lumOff val="0"/>
-            <a:alphaOff val="0"/>
-          </a:schemeClr>
-        </a:solidFill>
-        <a:ln>
-          <a:noFill/>
-        </a:ln>
-        <a:effectLst/>
-      </dsp:spPr>
-      <dsp:style>
-        <a:lnRef idx="0">
-          <a:scrgbClr r="0" g="0" b="0"/>
-        </a:lnRef>
-        <a:fillRef idx="1">
-          <a:scrgbClr r="0" g="0" b="0"/>
-        </a:fillRef>
-        <a:effectRef idx="0">
-          <a:scrgbClr r="0" g="0" b="0"/>
-        </a:effectRef>
-        <a:fontRef idx="minor">
-          <a:schemeClr val="lt1"/>
-        </a:fontRef>
-      </dsp:style>
-      <dsp:txBody>
-        <a:bodyPr spcFirstLastPara="0" vert="horz" wrap="square" lIns="0" tIns="0" rIns="0" bIns="0" numCol="1" spcCol="1270" anchor="ctr" anchorCtr="0">
-          <a:noAutofit/>
-        </a:bodyPr>
-        <a:lstStyle/>
-        <a:p>
-          <a:pPr lvl="0" algn="ctr" defTabSz="844550">
-            <a:lnSpc>
-              <a:spcPct val="90000"/>
-            </a:lnSpc>
-            <a:spcBef>
-              <a:spcPct val="0"/>
-            </a:spcBef>
-            <a:spcAft>
-              <a:spcPct val="35000"/>
-            </a:spcAft>
-          </a:pPr>
-          <a:endParaRPr lang="fr-FR" sz="1900" kern="1200"/>
-        </a:p>
-      </dsp:txBody>
-      <dsp:txXfrm>
-        <a:off x="4247887" y="3307556"/>
-        <a:ext cx="384631" cy="275828"/>
-      </dsp:txXfrm>
-    </dsp:sp>
-    <dsp:sp modelId="{E6B2E1D0-6A3F-4C9B-8081-D3E080662615}">
-      <dsp:nvSpPr>
-        <dsp:cNvPr id="0" name=""/>
-        <dsp:cNvSpPr/>
-      </dsp:nvSpPr>
-      <dsp:spPr>
-        <a:xfrm>
-          <a:off x="4174422" y="3952573"/>
-          <a:ext cx="1399385" cy="1081675"/>
-        </a:xfrm>
-        <a:prstGeom prst="ellipse">
-          <a:avLst/>
-        </a:prstGeom>
-        <a:solidFill>
-          <a:schemeClr val="accent1">
-            <a:hueOff val="0"/>
-            <a:satOff val="0"/>
-            <a:lumOff val="0"/>
-            <a:alphaOff val="0"/>
-          </a:schemeClr>
-        </a:solidFill>
-        <a:ln w="12700" cap="flat" cmpd="sng" algn="ctr">
-          <a:solidFill>
-            <a:schemeClr val="lt1">
-              <a:hueOff val="0"/>
-              <a:satOff val="0"/>
-              <a:lumOff val="0"/>
-              <a:alphaOff val="0"/>
-            </a:schemeClr>
-          </a:solidFill>
-          <a:prstDash val="solid"/>
-          <a:miter lim="800000"/>
-        </a:ln>
-        <a:effectLst/>
-      </dsp:spPr>
-      <dsp:style>
-        <a:lnRef idx="2">
-          <a:scrgbClr r="0" g="0" b="0"/>
-        </a:lnRef>
-        <a:fillRef idx="1">
-          <a:scrgbClr r="0" g="0" b="0"/>
-        </a:fillRef>
-        <a:effectRef idx="0">
-          <a:scrgbClr r="0" g="0" b="0"/>
-        </a:effectRef>
-        <a:fontRef idx="minor">
-          <a:schemeClr val="lt1"/>
-        </a:fontRef>
-      </dsp:style>
-      <dsp:txBody>
-        <a:bodyPr spcFirstLastPara="0" vert="horz" wrap="square" lIns="13970" tIns="13970" rIns="13970" bIns="13970" numCol="1" spcCol="1270" anchor="ctr" anchorCtr="0">
-          <a:noAutofit/>
-        </a:bodyPr>
-        <a:lstStyle/>
-        <a:p>
-          <a:pPr lvl="0" algn="ctr" defTabSz="488950">
-            <a:lnSpc>
-              <a:spcPct val="90000"/>
-            </a:lnSpc>
-            <a:spcBef>
-              <a:spcPct val="0"/>
-            </a:spcBef>
-            <a:spcAft>
-              <a:spcPct val="35000"/>
-            </a:spcAft>
-          </a:pPr>
-          <a:r>
-            <a:rPr lang="fr-FR" sz="1100" b="1" kern="1200" dirty="0" smtClean="0">
-              <a:solidFill>
-                <a:schemeClr val="dk1"/>
-              </a:solidFill>
-              <a:latin typeface="MV Boli" panose="02000500030200090000" pitchFamily="2" charset="0"/>
-              <a:cs typeface="MV Boli" panose="02000500030200090000" pitchFamily="2" charset="0"/>
-            </a:rPr>
-            <a:t>Collaboration</a:t>
-          </a:r>
-          <a:endParaRPr lang="fr-FR" sz="1100" kern="1200" dirty="0"/>
-        </a:p>
-      </dsp:txBody>
-      <dsp:txXfrm>
-        <a:off x="4379357" y="4110981"/>
-        <a:ext cx="989515" cy="764859"/>
-      </dsp:txXfrm>
-    </dsp:sp>
-    <dsp:sp modelId="{01FB1642-A366-4A84-BC34-9FE43FE9BB3F}">
-      <dsp:nvSpPr>
-        <dsp:cNvPr id="0" name=""/>
-        <dsp:cNvSpPr/>
-      </dsp:nvSpPr>
-      <dsp:spPr>
-        <a:xfrm rot="6600000">
-          <a:off x="3493305" y="3309663"/>
-          <a:ext cx="540174" cy="459712"/>
-        </a:xfrm>
-        <a:prstGeom prst="rightArrow">
-          <a:avLst>
-            <a:gd name="adj1" fmla="val 60000"/>
-            <a:gd name="adj2" fmla="val 50000"/>
-          </a:avLst>
-        </a:prstGeom>
-        <a:solidFill>
-          <a:schemeClr val="accent1">
-            <a:tint val="60000"/>
-            <a:hueOff val="0"/>
-            <a:satOff val="0"/>
-            <a:lumOff val="0"/>
-            <a:alphaOff val="0"/>
-          </a:schemeClr>
-        </a:solidFill>
-        <a:ln>
-          <a:noFill/>
-        </a:ln>
-        <a:effectLst/>
-      </dsp:spPr>
-      <dsp:style>
-        <a:lnRef idx="0">
-          <a:scrgbClr r="0" g="0" b="0"/>
-        </a:lnRef>
-        <a:fillRef idx="1">
-          <a:scrgbClr r="0" g="0" b="0"/>
-        </a:fillRef>
-        <a:effectRef idx="0">
-          <a:scrgbClr r="0" g="0" b="0"/>
-        </a:effectRef>
-        <a:fontRef idx="minor">
-          <a:schemeClr val="lt1"/>
-        </a:fontRef>
-      </dsp:style>
-      <dsp:txBody>
-        <a:bodyPr spcFirstLastPara="0" vert="horz" wrap="square" lIns="0" tIns="0" rIns="0" bIns="0" numCol="1" spcCol="1270" anchor="ctr" anchorCtr="0">
-          <a:noAutofit/>
-        </a:bodyPr>
-        <a:lstStyle/>
-        <a:p>
-          <a:pPr lvl="0" algn="ctr" defTabSz="844550">
-            <a:lnSpc>
-              <a:spcPct val="90000"/>
-            </a:lnSpc>
-            <a:spcBef>
-              <a:spcPct val="0"/>
-            </a:spcBef>
-            <a:spcAft>
-              <a:spcPct val="35000"/>
-            </a:spcAft>
-          </a:pPr>
-          <a:endParaRPr lang="fr-FR" sz="1900" kern="1200"/>
-        </a:p>
-      </dsp:txBody>
-      <dsp:txXfrm rot="10800000">
-        <a:off x="3585847" y="3336807"/>
-        <a:ext cx="402260" cy="275828"/>
-      </dsp:txXfrm>
-    </dsp:sp>
-    <dsp:sp modelId="{C4638C15-D371-4F75-998A-E390F0813E89}">
-      <dsp:nvSpPr>
-        <dsp:cNvPr id="0" name=""/>
-        <dsp:cNvSpPr/>
-      </dsp:nvSpPr>
-      <dsp:spPr>
-        <a:xfrm>
-          <a:off x="2693483" y="4012604"/>
-          <a:ext cx="1401743" cy="1081675"/>
-        </a:xfrm>
-        <a:prstGeom prst="ellipse">
-          <a:avLst/>
-        </a:prstGeom>
-        <a:solidFill>
-          <a:schemeClr val="accent1">
-            <a:hueOff val="0"/>
-            <a:satOff val="0"/>
-            <a:lumOff val="0"/>
-            <a:alphaOff val="0"/>
-          </a:schemeClr>
-        </a:solidFill>
-        <a:ln w="12700" cap="flat" cmpd="sng" algn="ctr">
-          <a:solidFill>
-            <a:schemeClr val="lt1">
-              <a:hueOff val="0"/>
-              <a:satOff val="0"/>
-              <a:lumOff val="0"/>
-              <a:alphaOff val="0"/>
-            </a:schemeClr>
-          </a:solidFill>
-          <a:prstDash val="solid"/>
-          <a:miter lim="800000"/>
-        </a:ln>
-        <a:effectLst/>
-      </dsp:spPr>
-      <dsp:style>
-        <a:lnRef idx="2">
-          <a:scrgbClr r="0" g="0" b="0"/>
-        </a:lnRef>
-        <a:fillRef idx="1">
-          <a:scrgbClr r="0" g="0" b="0"/>
-        </a:fillRef>
-        <a:effectRef idx="0">
-          <a:scrgbClr r="0" g="0" b="0"/>
-        </a:effectRef>
-        <a:fontRef idx="minor">
-          <a:schemeClr val="lt1"/>
-        </a:fontRef>
-      </dsp:style>
-      <dsp:txBody>
-        <a:bodyPr spcFirstLastPara="0" vert="horz" wrap="square" lIns="13970" tIns="13970" rIns="13970" bIns="13970" numCol="1" spcCol="1270" anchor="ctr" anchorCtr="0">
-          <a:noAutofit/>
-        </a:bodyPr>
-        <a:lstStyle/>
-        <a:p>
-          <a:pPr lvl="0" algn="ctr" defTabSz="488950">
-            <a:lnSpc>
-              <a:spcPct val="90000"/>
-            </a:lnSpc>
-            <a:spcBef>
-              <a:spcPct val="0"/>
-            </a:spcBef>
-            <a:spcAft>
-              <a:spcPct val="35000"/>
-            </a:spcAft>
-          </a:pPr>
-          <a:r>
-            <a:rPr lang="fr-FR" sz="1100" b="1" kern="1200" dirty="0" smtClean="0">
-              <a:solidFill>
-                <a:schemeClr val="dk1"/>
-              </a:solidFill>
-              <a:latin typeface="MV Boli" panose="02000500030200090000" pitchFamily="2" charset="0"/>
-              <a:cs typeface="MV Boli" panose="02000500030200090000" pitchFamily="2" charset="0"/>
-            </a:rPr>
-            <a:t>Flexibilité aux changements</a:t>
-          </a:r>
-          <a:endParaRPr lang="fr-FR" sz="1100" kern="1200" dirty="0"/>
-        </a:p>
-      </dsp:txBody>
-      <dsp:txXfrm>
-        <a:off x="2898764" y="4171012"/>
-        <a:ext cx="991181" cy="764859"/>
-      </dsp:txXfrm>
-    </dsp:sp>
-    <dsp:sp modelId="{0BE213AD-73EB-47BB-A6F7-56635B90C58B}">
-      <dsp:nvSpPr>
-        <dsp:cNvPr id="0" name=""/>
-        <dsp:cNvSpPr/>
-      </dsp:nvSpPr>
-      <dsp:spPr>
-        <a:xfrm rot="9000000">
-          <a:off x="3004131" y="2870774"/>
-          <a:ext cx="521742" cy="459712"/>
-        </a:xfrm>
-        <a:prstGeom prst="rightArrow">
-          <a:avLst>
-            <a:gd name="adj1" fmla="val 60000"/>
-            <a:gd name="adj2" fmla="val 50000"/>
-          </a:avLst>
-        </a:prstGeom>
-        <a:solidFill>
-          <a:schemeClr val="accent1">
-            <a:tint val="60000"/>
-            <a:hueOff val="0"/>
-            <a:satOff val="0"/>
-            <a:lumOff val="0"/>
-            <a:alphaOff val="0"/>
-          </a:schemeClr>
-        </a:solidFill>
-        <a:ln>
-          <a:noFill/>
-        </a:ln>
-        <a:effectLst/>
-      </dsp:spPr>
-      <dsp:style>
-        <a:lnRef idx="0">
-          <a:scrgbClr r="0" g="0" b="0"/>
-        </a:lnRef>
-        <a:fillRef idx="1">
-          <a:scrgbClr r="0" g="0" b="0"/>
-        </a:fillRef>
-        <a:effectRef idx="0">
-          <a:scrgbClr r="0" g="0" b="0"/>
-        </a:effectRef>
-        <a:fontRef idx="minor">
-          <a:schemeClr val="lt1"/>
-        </a:fontRef>
-      </dsp:style>
-      <dsp:txBody>
-        <a:bodyPr spcFirstLastPara="0" vert="horz" wrap="square" lIns="0" tIns="0" rIns="0" bIns="0" numCol="1" spcCol="1270" anchor="ctr" anchorCtr="0">
-          <a:noAutofit/>
-        </a:bodyPr>
-        <a:lstStyle/>
-        <a:p>
-          <a:pPr lvl="0" algn="ctr" defTabSz="844550">
-            <a:lnSpc>
-              <a:spcPct val="90000"/>
-            </a:lnSpc>
-            <a:spcBef>
-              <a:spcPct val="0"/>
-            </a:spcBef>
-            <a:spcAft>
-              <a:spcPct val="35000"/>
-            </a:spcAft>
-          </a:pPr>
-          <a:endParaRPr lang="fr-FR" sz="1900" kern="1200"/>
-        </a:p>
-      </dsp:txBody>
-      <dsp:txXfrm rot="10800000">
-        <a:off x="3132807" y="2928238"/>
-        <a:ext cx="383828" cy="275828"/>
-      </dsp:txXfrm>
-    </dsp:sp>
-    <dsp:sp modelId="{135E0059-9DB3-46A0-BD27-D373518D1D2D}">
-      <dsp:nvSpPr>
-        <dsp:cNvPr id="0" name=""/>
-        <dsp:cNvSpPr/>
-      </dsp:nvSpPr>
-      <dsp:spPr>
-        <a:xfrm>
-          <a:off x="1707971" y="3107723"/>
-          <a:ext cx="1215976" cy="1081675"/>
-        </a:xfrm>
-        <a:prstGeom prst="ellipse">
-          <a:avLst/>
-        </a:prstGeom>
-        <a:solidFill>
-          <a:schemeClr val="accent1">
-            <a:hueOff val="0"/>
-            <a:satOff val="0"/>
-            <a:lumOff val="0"/>
-            <a:alphaOff val="0"/>
-          </a:schemeClr>
-        </a:solidFill>
-        <a:ln w="12700" cap="flat" cmpd="sng" algn="ctr">
-          <a:solidFill>
-            <a:schemeClr val="lt1">
-              <a:hueOff val="0"/>
-              <a:satOff val="0"/>
-              <a:lumOff val="0"/>
-              <a:alphaOff val="0"/>
-            </a:schemeClr>
-          </a:solidFill>
-          <a:prstDash val="solid"/>
-          <a:miter lim="800000"/>
-        </a:ln>
-        <a:effectLst/>
-      </dsp:spPr>
-      <dsp:style>
-        <a:lnRef idx="2">
-          <a:scrgbClr r="0" g="0" b="0"/>
-        </a:lnRef>
-        <a:fillRef idx="1">
-          <a:scrgbClr r="0" g="0" b="0"/>
-        </a:fillRef>
-        <a:effectRef idx="0">
-          <a:scrgbClr r="0" g="0" b="0"/>
-        </a:effectRef>
-        <a:fontRef idx="minor">
-          <a:schemeClr val="lt1"/>
-        </a:fontRef>
-      </dsp:style>
-      <dsp:txBody>
-        <a:bodyPr spcFirstLastPara="0" vert="horz" wrap="square" lIns="13970" tIns="13970" rIns="13970" bIns="13970" numCol="1" spcCol="1270" anchor="ctr" anchorCtr="0">
-          <a:noAutofit/>
-        </a:bodyPr>
-        <a:lstStyle/>
-        <a:p>
-          <a:pPr lvl="0" algn="ctr" defTabSz="488950">
-            <a:lnSpc>
-              <a:spcPct val="90000"/>
-            </a:lnSpc>
-            <a:spcBef>
-              <a:spcPct val="0"/>
-            </a:spcBef>
-            <a:spcAft>
-              <a:spcPct val="35000"/>
-            </a:spcAft>
-          </a:pPr>
-          <a:r>
-            <a:rPr lang="fr-FR" sz="1100" b="1" kern="1200" dirty="0" smtClean="0">
-              <a:solidFill>
-                <a:schemeClr val="dk1"/>
-              </a:solidFill>
-              <a:latin typeface="MV Boli" panose="02000500030200090000" pitchFamily="2" charset="0"/>
-              <a:cs typeface="MV Boli" panose="02000500030200090000" pitchFamily="2" charset="0"/>
-            </a:rPr>
-            <a:t>Participation active du client</a:t>
-          </a:r>
-          <a:endParaRPr lang="fr-FR" sz="1100" kern="1200" dirty="0"/>
-        </a:p>
-      </dsp:txBody>
-      <dsp:txXfrm>
-        <a:off x="1886047" y="3266131"/>
-        <a:ext cx="859824" cy="764859"/>
-      </dsp:txXfrm>
-    </dsp:sp>
-    <dsp:sp modelId="{E2D288FA-916E-47E5-9C4A-CF535AD94D9A}">
-      <dsp:nvSpPr>
-        <dsp:cNvPr id="0" name=""/>
-        <dsp:cNvSpPr/>
-      </dsp:nvSpPr>
-      <dsp:spPr>
-        <a:xfrm rot="11400000">
-          <a:off x="2854167" y="2218594"/>
-          <a:ext cx="547207" cy="459712"/>
-        </a:xfrm>
-        <a:prstGeom prst="rightArrow">
-          <a:avLst>
-            <a:gd name="adj1" fmla="val 60000"/>
-            <a:gd name="adj2" fmla="val 50000"/>
-          </a:avLst>
-        </a:prstGeom>
-        <a:solidFill>
-          <a:schemeClr val="accent1">
-            <a:tint val="60000"/>
-            <a:hueOff val="0"/>
-            <a:satOff val="0"/>
-            <a:lumOff val="0"/>
-            <a:alphaOff val="0"/>
-          </a:schemeClr>
-        </a:solidFill>
-        <a:ln>
-          <a:noFill/>
-        </a:ln>
-        <a:effectLst/>
-      </dsp:spPr>
-      <dsp:style>
-        <a:lnRef idx="0">
-          <a:scrgbClr r="0" g="0" b="0"/>
-        </a:lnRef>
-        <a:fillRef idx="1">
-          <a:scrgbClr r="0" g="0" b="0"/>
-        </a:fillRef>
-        <a:effectRef idx="0">
-          <a:scrgbClr r="0" g="0" b="0"/>
-        </a:effectRef>
-        <a:fontRef idx="minor">
-          <a:schemeClr val="lt1"/>
-        </a:fontRef>
-      </dsp:style>
-      <dsp:txBody>
-        <a:bodyPr spcFirstLastPara="0" vert="horz" wrap="square" lIns="0" tIns="0" rIns="0" bIns="0" numCol="1" spcCol="1270" anchor="ctr" anchorCtr="0">
-          <a:noAutofit/>
-        </a:bodyPr>
-        <a:lstStyle/>
-        <a:p>
-          <a:pPr lvl="0" algn="ctr" defTabSz="844550">
-            <a:lnSpc>
-              <a:spcPct val="90000"/>
-            </a:lnSpc>
-            <a:spcBef>
-              <a:spcPct val="0"/>
-            </a:spcBef>
-            <a:spcAft>
-              <a:spcPct val="35000"/>
-            </a:spcAft>
-          </a:pPr>
-          <a:endParaRPr lang="fr-FR" sz="1900" kern="1200"/>
-        </a:p>
-      </dsp:txBody>
-      <dsp:txXfrm rot="10800000">
-        <a:off x="2991033" y="2322510"/>
-        <a:ext cx="409293" cy="275828"/>
-      </dsp:txXfrm>
-    </dsp:sp>
-    <dsp:sp modelId="{E01A6A31-A850-4A73-B303-64554FEBDDC2}">
-      <dsp:nvSpPr>
-        <dsp:cNvPr id="0" name=""/>
-        <dsp:cNvSpPr/>
-      </dsp:nvSpPr>
-      <dsp:spPr>
-        <a:xfrm>
-          <a:off x="1530669" y="1721365"/>
-          <a:ext cx="1081675" cy="1081675"/>
-        </a:xfrm>
-        <a:prstGeom prst="ellipse">
-          <a:avLst/>
-        </a:prstGeom>
-        <a:solidFill>
-          <a:schemeClr val="accent1">
-            <a:hueOff val="0"/>
-            <a:satOff val="0"/>
-            <a:lumOff val="0"/>
-            <a:alphaOff val="0"/>
-          </a:schemeClr>
-        </a:solidFill>
-        <a:ln w="12700" cap="flat" cmpd="sng" algn="ctr">
-          <a:solidFill>
-            <a:schemeClr val="lt1">
-              <a:hueOff val="0"/>
-              <a:satOff val="0"/>
-              <a:lumOff val="0"/>
-              <a:alphaOff val="0"/>
-            </a:schemeClr>
-          </a:solidFill>
-          <a:prstDash val="solid"/>
-          <a:miter lim="800000"/>
-        </a:ln>
-        <a:effectLst/>
-      </dsp:spPr>
-      <dsp:style>
-        <a:lnRef idx="2">
-          <a:scrgbClr r="0" g="0" b="0"/>
-        </a:lnRef>
-        <a:fillRef idx="1">
-          <a:scrgbClr r="0" g="0" b="0"/>
-        </a:fillRef>
-        <a:effectRef idx="0">
-          <a:scrgbClr r="0" g="0" b="0"/>
-        </a:effectRef>
-        <a:fontRef idx="minor">
-          <a:schemeClr val="lt1"/>
-        </a:fontRef>
-      </dsp:style>
-      <dsp:txBody>
-        <a:bodyPr spcFirstLastPara="0" vert="horz" wrap="square" lIns="13970" tIns="13970" rIns="13970" bIns="13970" numCol="1" spcCol="1270" anchor="ctr" anchorCtr="0">
-          <a:noAutofit/>
-        </a:bodyPr>
-        <a:lstStyle/>
-        <a:p>
-          <a:pPr lvl="0" algn="ctr" defTabSz="488950">
-            <a:lnSpc>
-              <a:spcPct val="90000"/>
-            </a:lnSpc>
-            <a:spcBef>
-              <a:spcPct val="0"/>
-            </a:spcBef>
-            <a:spcAft>
-              <a:spcPct val="35000"/>
-            </a:spcAft>
-          </a:pPr>
-          <a:r>
-            <a:rPr lang="fr-FR" sz="1100" b="1" kern="1200" dirty="0" smtClean="0">
-              <a:solidFill>
-                <a:schemeClr val="dk1"/>
-              </a:solidFill>
-              <a:latin typeface="MV Boli" panose="02000500030200090000" pitchFamily="2" charset="0"/>
-              <a:cs typeface="MV Boli" panose="02000500030200090000" pitchFamily="2" charset="0"/>
-            </a:rPr>
-            <a:t>Feedback</a:t>
-          </a:r>
-          <a:endParaRPr lang="fr-FR" sz="1100" kern="1200" dirty="0"/>
-        </a:p>
-      </dsp:txBody>
-      <dsp:txXfrm>
-        <a:off x="1689077" y="1879773"/>
-        <a:ext cx="764859" cy="764859"/>
-      </dsp:txXfrm>
-    </dsp:sp>
-    <dsp:sp modelId="{31B7304B-ECE5-4226-8502-3C1499C47242}">
-      <dsp:nvSpPr>
-        <dsp:cNvPr id="0" name=""/>
-        <dsp:cNvSpPr/>
-      </dsp:nvSpPr>
-      <dsp:spPr>
-        <a:xfrm rot="13800000">
-          <a:off x="3191203" y="1634830"/>
-          <a:ext cx="547207" cy="459712"/>
-        </a:xfrm>
-        <a:prstGeom prst="rightArrow">
-          <a:avLst>
-            <a:gd name="adj1" fmla="val 60000"/>
-            <a:gd name="adj2" fmla="val 50000"/>
-          </a:avLst>
-        </a:prstGeom>
-        <a:solidFill>
-          <a:schemeClr val="accent1">
-            <a:tint val="60000"/>
-            <a:hueOff val="0"/>
-            <a:satOff val="0"/>
-            <a:lumOff val="0"/>
-            <a:alphaOff val="0"/>
-          </a:schemeClr>
-        </a:solidFill>
-        <a:ln>
-          <a:noFill/>
-        </a:ln>
-        <a:effectLst/>
-      </dsp:spPr>
-      <dsp:style>
-        <a:lnRef idx="0">
-          <a:scrgbClr r="0" g="0" b="0"/>
-        </a:lnRef>
-        <a:fillRef idx="1">
-          <a:scrgbClr r="0" g="0" b="0"/>
-        </a:fillRef>
-        <a:effectRef idx="0">
-          <a:scrgbClr r="0" g="0" b="0"/>
-        </a:effectRef>
-        <a:fontRef idx="minor">
-          <a:schemeClr val="lt1"/>
-        </a:fontRef>
-      </dsp:style>
-      <dsp:txBody>
-        <a:bodyPr spcFirstLastPara="0" vert="horz" wrap="square" lIns="0" tIns="0" rIns="0" bIns="0" numCol="1" spcCol="1270" anchor="ctr" anchorCtr="0">
-          <a:noAutofit/>
-        </a:bodyPr>
-        <a:lstStyle/>
-        <a:p>
-          <a:pPr lvl="0" algn="ctr" defTabSz="844550">
-            <a:lnSpc>
-              <a:spcPct val="90000"/>
-            </a:lnSpc>
-            <a:spcBef>
-              <a:spcPct val="0"/>
-            </a:spcBef>
-            <a:spcAft>
-              <a:spcPct val="35000"/>
-            </a:spcAft>
-          </a:pPr>
-          <a:endParaRPr lang="fr-FR" sz="1900" kern="1200"/>
-        </a:p>
-      </dsp:txBody>
-      <dsp:txXfrm rot="10800000">
-        <a:off x="3304485" y="1779596"/>
-        <a:ext cx="409293" cy="275828"/>
-      </dsp:txXfrm>
-    </dsp:sp>
-    <dsp:sp modelId="{BB6B968A-4965-42BC-8FDC-03991FDE51C0}">
-      <dsp:nvSpPr>
-        <dsp:cNvPr id="0" name=""/>
-        <dsp:cNvSpPr/>
-      </dsp:nvSpPr>
-      <dsp:spPr>
-        <a:xfrm>
-          <a:off x="2234542" y="502221"/>
-          <a:ext cx="1081675" cy="1081675"/>
-        </a:xfrm>
-        <a:prstGeom prst="ellipse">
-          <a:avLst/>
-        </a:prstGeom>
-        <a:solidFill>
-          <a:schemeClr val="accent1">
-            <a:hueOff val="0"/>
-            <a:satOff val="0"/>
-            <a:lumOff val="0"/>
-            <a:alphaOff val="0"/>
-          </a:schemeClr>
-        </a:solidFill>
-        <a:ln w="12700" cap="flat" cmpd="sng" algn="ctr">
-          <a:solidFill>
-            <a:schemeClr val="lt1">
-              <a:hueOff val="0"/>
-              <a:satOff val="0"/>
-              <a:lumOff val="0"/>
-              <a:alphaOff val="0"/>
-            </a:schemeClr>
-          </a:solidFill>
-          <a:prstDash val="solid"/>
-          <a:miter lim="800000"/>
-        </a:ln>
-        <a:effectLst/>
-      </dsp:spPr>
-      <dsp:style>
-        <a:lnRef idx="2">
-          <a:scrgbClr r="0" g="0" b="0"/>
-        </a:lnRef>
-        <a:fillRef idx="1">
-          <a:scrgbClr r="0" g="0" b="0"/>
-        </a:fillRef>
-        <a:effectRef idx="0">
-          <a:scrgbClr r="0" g="0" b="0"/>
-        </a:effectRef>
-        <a:fontRef idx="minor">
-          <a:schemeClr val="lt1"/>
-        </a:fontRef>
-      </dsp:style>
-      <dsp:txBody>
-        <a:bodyPr spcFirstLastPara="0" vert="horz" wrap="square" lIns="13970" tIns="13970" rIns="13970" bIns="13970" numCol="1" spcCol="1270" anchor="ctr" anchorCtr="0">
-          <a:noAutofit/>
-        </a:bodyPr>
-        <a:lstStyle/>
-        <a:p>
-          <a:pPr lvl="0" algn="ctr" defTabSz="488950">
-            <a:lnSpc>
-              <a:spcPct val="90000"/>
-            </a:lnSpc>
-            <a:spcBef>
-              <a:spcPct val="0"/>
-            </a:spcBef>
-            <a:spcAft>
-              <a:spcPct val="35000"/>
-            </a:spcAft>
-          </a:pPr>
-          <a:r>
-            <a:rPr lang="fr-FR" sz="1100" b="1" kern="1200" dirty="0" err="1" smtClean="0">
-              <a:solidFill>
-                <a:schemeClr val="dk1"/>
-              </a:solidFill>
-              <a:latin typeface="MV Boli" panose="02000500030200090000" pitchFamily="2" charset="0"/>
-              <a:cs typeface="MV Boli" panose="02000500030200090000" pitchFamily="2" charset="0"/>
-            </a:rPr>
-            <a:t>Communica-tion</a:t>
-          </a:r>
-          <a:endParaRPr lang="fr-FR" sz="1100" kern="1200" dirty="0"/>
-        </a:p>
-      </dsp:txBody>
-      <dsp:txXfrm>
-        <a:off x="2392950" y="660629"/>
-        <a:ext cx="764859" cy="764859"/>
-      </dsp:txXfrm>
-    </dsp:sp>
   </dsp:spTree>
 </dsp:drawing>
 </file>
@@ -4639,7 +3162,7 @@
           <a:p>
             <a:fld id="{D39650A6-D3AB-4EB9-A164-9281AC7AAFB6}" type="datetimeFigureOut">
               <a:rPr lang="fr-FR" smtClean="0"/>
-              <a:t>17/02/2019</a:t>
+              <a:t>18/02/2019</a:t>
             </a:fld>
             <a:endParaRPr lang="fr-FR"/>
           </a:p>
@@ -4806,7 +3329,7 @@
             <a:fld id="{0D48DD09-A0A5-45C1-8FB1-F5F595257802}" type="datetimeFigureOut">
               <a:rPr lang="fr-FR" smtClean="0"/>
               <a:pPr/>
-              <a:t>17/02/2019</a:t>
+              <a:t>18/02/2019</a:t>
             </a:fld>
             <a:endParaRPr lang="fr-FR"/>
           </a:p>
@@ -6371,7 +4894,7 @@
           <a:p>
             <a:fld id="{D41EDB7F-0013-4A0B-91ED-D694544E861D}" type="datetime1">
               <a:rPr lang="fr-FR" smtClean="0"/>
-              <a:t>17/02/2019</a:t>
+              <a:t>18/02/2019</a:t>
             </a:fld>
             <a:endParaRPr lang="fr-FR"/>
           </a:p>
@@ -6542,7 +5065,7 @@
           <a:p>
             <a:fld id="{ACC2DE89-BD2F-453B-A8A9-7B966E17934A}" type="datetime1">
               <a:rPr lang="fr-FR" smtClean="0"/>
-              <a:t>17/02/2019</a:t>
+              <a:t>18/02/2019</a:t>
             </a:fld>
             <a:endParaRPr lang="fr-FR"/>
           </a:p>
@@ -6723,7 +5246,7 @@
           <a:p>
             <a:fld id="{78332BF2-D265-440D-9B29-50E699FDD773}" type="datetime1">
               <a:rPr lang="fr-FR" smtClean="0"/>
-              <a:t>17/02/2019</a:t>
+              <a:t>18/02/2019</a:t>
             </a:fld>
             <a:endParaRPr lang="fr-FR"/>
           </a:p>
@@ -6906,7 +5429,7 @@
                   <a:srgbClr val="5A5A5A"/>
                 </a:solidFill>
               </a:rPr>
-              <a:t>17/02/2019</a:t>
+              <a:t>18/02/2019</a:t>
             </a:fld>
             <a:endParaRPr lang="nl-NL">
               <a:solidFill>
@@ -7180,7 +5703,7 @@
           <a:p>
             <a:fld id="{43CB20EF-1A7A-4839-8A56-3FECC0601E9C}" type="datetime1">
               <a:rPr lang="fr-FR" smtClean="0"/>
-              <a:t>17/02/2019</a:t>
+              <a:t>18/02/2019</a:t>
             </a:fld>
             <a:endParaRPr lang="fr-FR"/>
           </a:p>
@@ -7427,7 +5950,7 @@
           <a:p>
             <a:fld id="{A958B01A-D592-475C-822C-2C9E97B2E316}" type="datetime1">
               <a:rPr lang="fr-FR" smtClean="0"/>
-              <a:t>17/02/2019</a:t>
+              <a:t>18/02/2019</a:t>
             </a:fld>
             <a:endParaRPr lang="fr-FR"/>
           </a:p>
@@ -7660,7 +6183,7 @@
           <a:p>
             <a:fld id="{425654FC-777D-4205-A07A-EF6AD76B9F59}" type="datetime1">
               <a:rPr lang="fr-FR" smtClean="0"/>
-              <a:t>17/02/2019</a:t>
+              <a:t>18/02/2019</a:t>
             </a:fld>
             <a:endParaRPr lang="fr-FR"/>
           </a:p>
@@ -8028,7 +6551,7 @@
           <a:p>
             <a:fld id="{B2D17364-DBC7-4600-9F9B-EBAA212FA1C0}" type="datetime1">
               <a:rPr lang="fr-FR" smtClean="0"/>
-              <a:t>17/02/2019</a:t>
+              <a:t>18/02/2019</a:t>
             </a:fld>
             <a:endParaRPr lang="fr-FR"/>
           </a:p>
@@ -8147,7 +6670,7 @@
           <a:p>
             <a:fld id="{90F4B47F-81AC-4E12-9DFB-C12E1BFCCE73}" type="datetime1">
               <a:rPr lang="fr-FR" smtClean="0"/>
-              <a:t>17/02/2019</a:t>
+              <a:t>18/02/2019</a:t>
             </a:fld>
             <a:endParaRPr lang="fr-FR"/>
           </a:p>
@@ -8243,7 +6766,7 @@
           <a:p>
             <a:fld id="{EBA30911-6681-4FF1-B7E9-012026C38593}" type="datetime1">
               <a:rPr lang="fr-FR" smtClean="0"/>
-              <a:t>17/02/2019</a:t>
+              <a:t>18/02/2019</a:t>
             </a:fld>
             <a:endParaRPr lang="fr-FR"/>
           </a:p>
@@ -8521,7 +7044,7 @@
           <a:p>
             <a:fld id="{F35A8858-BA41-4F58-AC08-843D858274A5}" type="datetime1">
               <a:rPr lang="fr-FR" smtClean="0"/>
-              <a:t>17/02/2019</a:t>
+              <a:t>18/02/2019</a:t>
             </a:fld>
             <a:endParaRPr lang="fr-FR"/>
           </a:p>
@@ -8775,7 +7298,7 @@
           <a:p>
             <a:fld id="{FEE2A754-7588-49A4-B71D-3454FB4E406C}" type="datetime1">
               <a:rPr lang="fr-FR" smtClean="0"/>
-              <a:t>17/02/2019</a:t>
+              <a:t>18/02/2019</a:t>
             </a:fld>
             <a:endParaRPr lang="fr-FR"/>
           </a:p>
@@ -8989,7 +7512,7 @@
           <a:p>
             <a:fld id="{250284DE-CA6D-457C-8865-8F9EFE96BD77}" type="datetime1">
               <a:rPr lang="fr-FR" smtClean="0"/>
-              <a:t>17/02/2019</a:t>
+              <a:t>18/02/2019</a:t>
             </a:fld>
             <a:endParaRPr lang="fr-FR"/>
           </a:p>
@@ -10749,7 +9272,7 @@
           <p:cNvPr id="74" name="TextBox 15">
             <a:extLst>
               <a:ext uri="{FF2B5EF4-FFF2-40B4-BE49-F238E27FC236}">
-                <a16:creationId xmlns:a16="http://schemas.microsoft.com/office/drawing/2014/main" xmlns="" id="{8C4C6669-C30C-4DF4-A970-B262BF22AC28}"/>
+                <a16:creationId xmlns="" xmlns:a16="http://schemas.microsoft.com/office/drawing/2014/main" id="{8C4C6669-C30C-4DF4-A970-B262BF22AC28}"/>
               </a:ext>
             </a:extLst>
           </p:cNvPr>
@@ -11702,7 +10225,7 @@
           <p:cNvPr id="74" name="TextBox 15">
             <a:extLst>
               <a:ext uri="{FF2B5EF4-FFF2-40B4-BE49-F238E27FC236}">
-                <a16:creationId xmlns:a16="http://schemas.microsoft.com/office/drawing/2014/main" xmlns="" id="{8C4C6669-C30C-4DF4-A970-B262BF22AC28}"/>
+                <a16:creationId xmlns="" xmlns:a16="http://schemas.microsoft.com/office/drawing/2014/main" id="{8C4C6669-C30C-4DF4-A970-B262BF22AC28}"/>
               </a:ext>
             </a:extLst>
           </p:cNvPr>
@@ -12533,7 +11056,7 @@
           <p:cNvPr id="74" name="TextBox 15">
             <a:extLst>
               <a:ext uri="{FF2B5EF4-FFF2-40B4-BE49-F238E27FC236}">
-                <a16:creationId xmlns:a16="http://schemas.microsoft.com/office/drawing/2014/main" xmlns="" id="{8C4C6669-C30C-4DF4-A970-B262BF22AC28}"/>
+                <a16:creationId xmlns="" xmlns:a16="http://schemas.microsoft.com/office/drawing/2014/main" id="{8C4C6669-C30C-4DF4-A970-B262BF22AC28}"/>
               </a:ext>
             </a:extLst>
           </p:cNvPr>
@@ -15367,7 +13890,7 @@
           <p:cNvPr id="74" name="TextBox 15">
             <a:extLst>
               <a:ext uri="{FF2B5EF4-FFF2-40B4-BE49-F238E27FC236}">
-                <a16:creationId xmlns:a16="http://schemas.microsoft.com/office/drawing/2014/main" xmlns="" id="{8C4C6669-C30C-4DF4-A970-B262BF22AC28}"/>
+                <a16:creationId xmlns="" xmlns:a16="http://schemas.microsoft.com/office/drawing/2014/main" id="{8C4C6669-C30C-4DF4-A970-B262BF22AC28}"/>
               </a:ext>
             </a:extLst>
           </p:cNvPr>
@@ -19198,7 +17721,7 @@
           <p:cNvPr id="74" name="TextBox 15">
             <a:extLst>
               <a:ext uri="{FF2B5EF4-FFF2-40B4-BE49-F238E27FC236}">
-                <a16:creationId xmlns:a16="http://schemas.microsoft.com/office/drawing/2014/main" xmlns="" id="{8C4C6669-C30C-4DF4-A970-B262BF22AC28}"/>
+                <a16:creationId xmlns="" xmlns:a16="http://schemas.microsoft.com/office/drawing/2014/main" id="{8C4C6669-C30C-4DF4-A970-B262BF22AC28}"/>
               </a:ext>
             </a:extLst>
           </p:cNvPr>
@@ -19975,7 +18498,7 @@
           <p:cNvPr id="74" name="TextBox 15">
             <a:extLst>
               <a:ext uri="{FF2B5EF4-FFF2-40B4-BE49-F238E27FC236}">
-                <a16:creationId xmlns:a16="http://schemas.microsoft.com/office/drawing/2014/main" xmlns="" id="{8C4C6669-C30C-4DF4-A970-B262BF22AC28}"/>
+                <a16:creationId xmlns="" xmlns:a16="http://schemas.microsoft.com/office/drawing/2014/main" id="{8C4C6669-C30C-4DF4-A970-B262BF22AC28}"/>
               </a:ext>
             </a:extLst>
           </p:cNvPr>
@@ -20392,7 +18915,7 @@
         <p:spPr>
           <a:xfrm>
             <a:off x="539551" y="1844824"/>
-            <a:ext cx="8217163" cy="5032147"/>
+            <a:ext cx="8217163" cy="5770811"/>
           </a:xfrm>
           <a:prstGeom prst="rect">
             <a:avLst/>
@@ -20519,8 +19042,47 @@
                 <a:latin typeface="MV Boli" panose="02000500030200090000" pitchFamily="2" charset="0"/>
                 <a:cs typeface="MV Boli" panose="02000500030200090000" pitchFamily="2" charset="0"/>
               </a:rPr>
-              <a:t>Gestion des conflits</a:t>
-            </a:r>
+              <a:t>Gestion des </a:t>
+            </a:r>
+            <a:r>
+              <a:rPr lang="fr-FR" sz="2400" b="1" dirty="0" smtClean="0">
+                <a:solidFill>
+                  <a:schemeClr val="dk1"/>
+                </a:solidFill>
+                <a:latin typeface="MV Boli" panose="02000500030200090000" pitchFamily="2" charset="0"/>
+                <a:cs typeface="MV Boli" panose="02000500030200090000" pitchFamily="2" charset="0"/>
+              </a:rPr>
+              <a:t>conflits</a:t>
+            </a:r>
+          </a:p>
+          <a:p>
+            <a:pPr marL="342900" indent="-342900">
+              <a:lnSpc>
+                <a:spcPct val="200000"/>
+              </a:lnSpc>
+              <a:buClr>
+                <a:srgbClr val="00B050"/>
+              </a:buClr>
+              <a:buFont typeface="Wingdings" panose="05000000000000000000" pitchFamily="2" charset="2"/>
+              <a:buChar char="ü"/>
+            </a:pPr>
+            <a:r>
+              <a:rPr lang="fr-FR" sz="2400" b="1" smtClean="0">
+                <a:solidFill>
+                  <a:schemeClr val="dk1"/>
+                </a:solidFill>
+                <a:latin typeface="MV Boli" panose="02000500030200090000" pitchFamily="2" charset="0"/>
+                <a:cs typeface="MV Boli" panose="02000500030200090000" pitchFamily="2" charset="0"/>
+              </a:rPr>
+              <a:t>Collaboration</a:t>
+            </a:r>
+            <a:endParaRPr lang="fr-FR" sz="2400" b="1" dirty="0">
+              <a:solidFill>
+                <a:schemeClr val="dk1"/>
+              </a:solidFill>
+              <a:latin typeface="MV Boli" panose="02000500030200090000" pitchFamily="2" charset="0"/>
+              <a:cs typeface="MV Boli" panose="02000500030200090000" pitchFamily="2" charset="0"/>
+            </a:endParaRPr>
           </a:p>
           <a:p>
             <a:pPr>
@@ -20842,6 +19404,67 @@
                       </p:childTnLst>
                     </p:cTn>
                   </p:par>
+                  <p:par>
+                    <p:cTn id="23" fill="hold">
+                      <p:stCondLst>
+                        <p:cond delay="indefinite"/>
+                      </p:stCondLst>
+                      <p:childTnLst>
+                        <p:par>
+                          <p:cTn id="24" fill="hold">
+                            <p:stCondLst>
+                              <p:cond delay="0"/>
+                            </p:stCondLst>
+                            <p:childTnLst>
+                              <p:par>
+                                <p:cTn id="25" presetID="22" presetClass="entr" presetSubtype="4" fill="hold" nodeType="clickEffect">
+                                  <p:stCondLst>
+                                    <p:cond delay="0"/>
+                                  </p:stCondLst>
+                                  <p:childTnLst>
+                                    <p:set>
+                                      <p:cBhvr>
+                                        <p:cTn id="26" dur="1" fill="hold">
+                                          <p:stCondLst>
+                                            <p:cond delay="0"/>
+                                          </p:stCondLst>
+                                        </p:cTn>
+                                        <p:tgtEl>
+                                          <p:spTgt spid="4">
+                                            <p:txEl>
+                                              <p:pRg st="5" end="5"/>
+                                            </p:txEl>
+                                          </p:spTgt>
+                                        </p:tgtEl>
+                                        <p:attrNameLst>
+                                          <p:attrName>style.visibility</p:attrName>
+                                        </p:attrNameLst>
+                                      </p:cBhvr>
+                                      <p:to>
+                                        <p:strVal val="visible"/>
+                                      </p:to>
+                                    </p:set>
+                                    <p:animEffect transition="in" filter="wipe(down)">
+                                      <p:cBhvr>
+                                        <p:cTn id="27" dur="500"/>
+                                        <p:tgtEl>
+                                          <p:spTgt spid="4">
+                                            <p:txEl>
+                                              <p:pRg st="5" end="5"/>
+                                            </p:txEl>
+                                          </p:spTgt>
+                                        </p:tgtEl>
+                                      </p:cBhvr>
+                                    </p:animEffect>
+                                  </p:childTnLst>
+                                </p:cTn>
+                              </p:par>
+                            </p:childTnLst>
+                          </p:cTn>
+                        </p:par>
+                      </p:childTnLst>
+                    </p:cTn>
+                  </p:par>
                 </p:childTnLst>
               </p:cTn>
               <p:prevCondLst>
@@ -21053,7 +19676,7 @@
           <p:cNvPr id="74" name="TextBox 15">
             <a:extLst>
               <a:ext uri="{FF2B5EF4-FFF2-40B4-BE49-F238E27FC236}">
-                <a16:creationId xmlns:a16="http://schemas.microsoft.com/office/drawing/2014/main" xmlns="" id="{8C4C6669-C30C-4DF4-A970-B262BF22AC28}"/>
+                <a16:creationId xmlns="" xmlns:a16="http://schemas.microsoft.com/office/drawing/2014/main" id="{8C4C6669-C30C-4DF4-A970-B262BF22AC28}"/>
               </a:ext>
             </a:extLst>
           </p:cNvPr>
@@ -21612,7 +20235,7 @@
           <p:cNvPr id="74" name="TextBox 15">
             <a:extLst>
               <a:ext uri="{FF2B5EF4-FFF2-40B4-BE49-F238E27FC236}">
-                <a16:creationId xmlns:a16="http://schemas.microsoft.com/office/drawing/2014/main" xmlns="" id="{8C4C6669-C30C-4DF4-A970-B262BF22AC28}"/>
+                <a16:creationId xmlns="" xmlns:a16="http://schemas.microsoft.com/office/drawing/2014/main" id="{8C4C6669-C30C-4DF4-A970-B262BF22AC28}"/>
               </a:ext>
             </a:extLst>
           </p:cNvPr>
@@ -22966,7 +21589,7 @@
           <p:cNvPr id="74" name="TextBox 15">
             <a:extLst>
               <a:ext uri="{FF2B5EF4-FFF2-40B4-BE49-F238E27FC236}">
-                <a16:creationId xmlns:a16="http://schemas.microsoft.com/office/drawing/2014/main" xmlns="" id="{8C4C6669-C30C-4DF4-A970-B262BF22AC28}"/>
+                <a16:creationId xmlns="" xmlns:a16="http://schemas.microsoft.com/office/drawing/2014/main" id="{8C4C6669-C30C-4DF4-A970-B262BF22AC28}"/>
               </a:ext>
             </a:extLst>
           </p:cNvPr>
@@ -24464,7 +23087,7 @@
           <p:cNvPr id="74" name="TextBox 15">
             <a:extLst>
               <a:ext uri="{FF2B5EF4-FFF2-40B4-BE49-F238E27FC236}">
-                <a16:creationId xmlns:a16="http://schemas.microsoft.com/office/drawing/2014/main" xmlns="" id="{8C4C6669-C30C-4DF4-A970-B262BF22AC28}"/>
+                <a16:creationId xmlns="" xmlns:a16="http://schemas.microsoft.com/office/drawing/2014/main" id="{8C4C6669-C30C-4DF4-A970-B262BF22AC28}"/>
               </a:ext>
             </a:extLst>
           </p:cNvPr>
@@ -25024,7 +23647,7 @@
           <p:cNvPr id="74" name="TextBox 15">
             <a:extLst>
               <a:ext uri="{FF2B5EF4-FFF2-40B4-BE49-F238E27FC236}">
-                <a16:creationId xmlns:a16="http://schemas.microsoft.com/office/drawing/2014/main" xmlns="" id="{8C4C6669-C30C-4DF4-A970-B262BF22AC28}"/>
+                <a16:creationId xmlns="" xmlns:a16="http://schemas.microsoft.com/office/drawing/2014/main" id="{8C4C6669-C30C-4DF4-A970-B262BF22AC28}"/>
               </a:ext>
             </a:extLst>
           </p:cNvPr>

</xml_diff>

<commit_message>
Presentation de Git version2
</commit_message>
<xml_diff>
--- a/Pres-Git.pptx
+++ b/Pres-Git.pptx
@@ -8097,7 +8097,7 @@
         <p:spPr>
           <a:xfrm>
             <a:off x="3399938" y="3812847"/>
-            <a:ext cx="2000232" cy="1200329"/>
+            <a:ext cx="2000232" cy="1508105"/>
           </a:xfrm>
           <a:prstGeom prst="rect">
             <a:avLst/>
@@ -8135,6 +8135,26 @@
           <a:p>
             <a:pPr algn="ctr"/>
             <a:r>
+              <a:rPr lang="fr-FR" sz="2000" b="1" smtClean="0">
+                <a:solidFill>
+                  <a:schemeClr val="dk1"/>
+                </a:solidFill>
+                <a:latin typeface="MV Boli" panose="02000500030200090000" pitchFamily="2" charset="0"/>
+                <a:cs typeface="MV Boli" panose="02000500030200090000" pitchFamily="2" charset="0"/>
+              </a:rPr>
+              <a:t>Hello Salhi</a:t>
+            </a:r>
+            <a:r>
+              <a:rPr lang="fr-FR" sz="2000" b="1" dirty="0" smtClean="0">
+                <a:solidFill>
+                  <a:schemeClr val="dk1"/>
+                </a:solidFill>
+                <a:latin typeface="MV Boli" panose="02000500030200090000" pitchFamily="2" charset="0"/>
+                <a:cs typeface="MV Boli" panose="02000500030200090000" pitchFamily="2" charset="0"/>
+              </a:rPr>
+              <a:t> </a:t>
+            </a:r>
+            <a:r>
               <a:rPr lang="fr-FR" sz="2000" b="1" dirty="0">
                 <a:solidFill>
                   <a:schemeClr val="dk1"/>
@@ -8142,25 +8162,8 @@
                 <a:latin typeface="MV Boli" panose="02000500030200090000" pitchFamily="2" charset="0"/>
                 <a:cs typeface="MV Boli" panose="02000500030200090000" pitchFamily="2" charset="0"/>
               </a:rPr>
-              <a:t>Salhi </a:t>
-            </a:r>
-            <a:r>
-              <a:rPr lang="fr-FR" sz="2000" b="1" dirty="0" err="1">
-                <a:solidFill>
-                  <a:schemeClr val="dk1"/>
-                </a:solidFill>
-                <a:latin typeface="MV Boli" panose="02000500030200090000" pitchFamily="2" charset="0"/>
-                <a:cs typeface="MV Boli" panose="02000500030200090000" pitchFamily="2" charset="0"/>
-              </a:rPr>
               <a:t>Karem</a:t>
             </a:r>
-            <a:endParaRPr lang="fr-FR" sz="2000" b="1" dirty="0">
-              <a:solidFill>
-                <a:schemeClr val="dk1"/>
-              </a:solidFill>
-              <a:latin typeface="MV Boli" panose="02000500030200090000" pitchFamily="2" charset="0"/>
-              <a:cs typeface="MV Boli" panose="02000500030200090000" pitchFamily="2" charset="0"/>
-            </a:endParaRPr>
           </a:p>
           <a:p>
             <a:pPr algn="ctr"/>
@@ -9272,7 +9275,7 @@
           <p:cNvPr id="74" name="TextBox 15">
             <a:extLst>
               <a:ext uri="{FF2B5EF4-FFF2-40B4-BE49-F238E27FC236}">
-                <a16:creationId xmlns="" xmlns:a16="http://schemas.microsoft.com/office/drawing/2014/main" id="{8C4C6669-C30C-4DF4-A970-B262BF22AC28}"/>
+                <a16:creationId xmlns:a16="http://schemas.microsoft.com/office/drawing/2014/main" xmlns="" id="{8C4C6669-C30C-4DF4-A970-B262BF22AC28}"/>
               </a:ext>
             </a:extLst>
           </p:cNvPr>
@@ -10225,7 +10228,7 @@
           <p:cNvPr id="74" name="TextBox 15">
             <a:extLst>
               <a:ext uri="{FF2B5EF4-FFF2-40B4-BE49-F238E27FC236}">
-                <a16:creationId xmlns="" xmlns:a16="http://schemas.microsoft.com/office/drawing/2014/main" id="{8C4C6669-C30C-4DF4-A970-B262BF22AC28}"/>
+                <a16:creationId xmlns:a16="http://schemas.microsoft.com/office/drawing/2014/main" xmlns="" id="{8C4C6669-C30C-4DF4-A970-B262BF22AC28}"/>
               </a:ext>
             </a:extLst>
           </p:cNvPr>
@@ -11056,7 +11059,7 @@
           <p:cNvPr id="74" name="TextBox 15">
             <a:extLst>
               <a:ext uri="{FF2B5EF4-FFF2-40B4-BE49-F238E27FC236}">
-                <a16:creationId xmlns="" xmlns:a16="http://schemas.microsoft.com/office/drawing/2014/main" id="{8C4C6669-C30C-4DF4-A970-B262BF22AC28}"/>
+                <a16:creationId xmlns:a16="http://schemas.microsoft.com/office/drawing/2014/main" xmlns="" id="{8C4C6669-C30C-4DF4-A970-B262BF22AC28}"/>
               </a:ext>
             </a:extLst>
           </p:cNvPr>
@@ -13890,7 +13893,7 @@
           <p:cNvPr id="74" name="TextBox 15">
             <a:extLst>
               <a:ext uri="{FF2B5EF4-FFF2-40B4-BE49-F238E27FC236}">
-                <a16:creationId xmlns="" xmlns:a16="http://schemas.microsoft.com/office/drawing/2014/main" id="{8C4C6669-C30C-4DF4-A970-B262BF22AC28}"/>
+                <a16:creationId xmlns:a16="http://schemas.microsoft.com/office/drawing/2014/main" xmlns="" id="{8C4C6669-C30C-4DF4-A970-B262BF22AC28}"/>
               </a:ext>
             </a:extLst>
           </p:cNvPr>
@@ -17721,7 +17724,7 @@
           <p:cNvPr id="74" name="TextBox 15">
             <a:extLst>
               <a:ext uri="{FF2B5EF4-FFF2-40B4-BE49-F238E27FC236}">
-                <a16:creationId xmlns="" xmlns:a16="http://schemas.microsoft.com/office/drawing/2014/main" id="{8C4C6669-C30C-4DF4-A970-B262BF22AC28}"/>
+                <a16:creationId xmlns:a16="http://schemas.microsoft.com/office/drawing/2014/main" xmlns="" id="{8C4C6669-C30C-4DF4-A970-B262BF22AC28}"/>
               </a:ext>
             </a:extLst>
           </p:cNvPr>
@@ -18498,7 +18501,7 @@
           <p:cNvPr id="74" name="TextBox 15">
             <a:extLst>
               <a:ext uri="{FF2B5EF4-FFF2-40B4-BE49-F238E27FC236}">
-                <a16:creationId xmlns="" xmlns:a16="http://schemas.microsoft.com/office/drawing/2014/main" id="{8C4C6669-C30C-4DF4-A970-B262BF22AC28}"/>
+                <a16:creationId xmlns:a16="http://schemas.microsoft.com/office/drawing/2014/main" xmlns="" id="{8C4C6669-C30C-4DF4-A970-B262BF22AC28}"/>
               </a:ext>
             </a:extLst>
           </p:cNvPr>
@@ -19676,7 +19679,7 @@
           <p:cNvPr id="74" name="TextBox 15">
             <a:extLst>
               <a:ext uri="{FF2B5EF4-FFF2-40B4-BE49-F238E27FC236}">
-                <a16:creationId xmlns="" xmlns:a16="http://schemas.microsoft.com/office/drawing/2014/main" id="{8C4C6669-C30C-4DF4-A970-B262BF22AC28}"/>
+                <a16:creationId xmlns:a16="http://schemas.microsoft.com/office/drawing/2014/main" xmlns="" id="{8C4C6669-C30C-4DF4-A970-B262BF22AC28}"/>
               </a:ext>
             </a:extLst>
           </p:cNvPr>
@@ -20235,7 +20238,7 @@
           <p:cNvPr id="74" name="TextBox 15">
             <a:extLst>
               <a:ext uri="{FF2B5EF4-FFF2-40B4-BE49-F238E27FC236}">
-                <a16:creationId xmlns="" xmlns:a16="http://schemas.microsoft.com/office/drawing/2014/main" id="{8C4C6669-C30C-4DF4-A970-B262BF22AC28}"/>
+                <a16:creationId xmlns:a16="http://schemas.microsoft.com/office/drawing/2014/main" xmlns="" id="{8C4C6669-C30C-4DF4-A970-B262BF22AC28}"/>
               </a:ext>
             </a:extLst>
           </p:cNvPr>
@@ -21589,7 +21592,7 @@
           <p:cNvPr id="74" name="TextBox 15">
             <a:extLst>
               <a:ext uri="{FF2B5EF4-FFF2-40B4-BE49-F238E27FC236}">
-                <a16:creationId xmlns="" xmlns:a16="http://schemas.microsoft.com/office/drawing/2014/main" id="{8C4C6669-C30C-4DF4-A970-B262BF22AC28}"/>
+                <a16:creationId xmlns:a16="http://schemas.microsoft.com/office/drawing/2014/main" xmlns="" id="{8C4C6669-C30C-4DF4-A970-B262BF22AC28}"/>
               </a:ext>
             </a:extLst>
           </p:cNvPr>
@@ -23087,7 +23090,7 @@
           <p:cNvPr id="74" name="TextBox 15">
             <a:extLst>
               <a:ext uri="{FF2B5EF4-FFF2-40B4-BE49-F238E27FC236}">
-                <a16:creationId xmlns="" xmlns:a16="http://schemas.microsoft.com/office/drawing/2014/main" id="{8C4C6669-C30C-4DF4-A970-B262BF22AC28}"/>
+                <a16:creationId xmlns:a16="http://schemas.microsoft.com/office/drawing/2014/main" xmlns="" id="{8C4C6669-C30C-4DF4-A970-B262BF22AC28}"/>
               </a:ext>
             </a:extLst>
           </p:cNvPr>
@@ -23647,7 +23650,7 @@
           <p:cNvPr id="74" name="TextBox 15">
             <a:extLst>
               <a:ext uri="{FF2B5EF4-FFF2-40B4-BE49-F238E27FC236}">
-                <a16:creationId xmlns="" xmlns:a16="http://schemas.microsoft.com/office/drawing/2014/main" id="{8C4C6669-C30C-4DF4-A970-B262BF22AC28}"/>
+                <a16:creationId xmlns:a16="http://schemas.microsoft.com/office/drawing/2014/main" xmlns="" id="{8C4C6669-C30C-4DF4-A970-B262BF22AC28}"/>
               </a:ext>
             </a:extLst>
           </p:cNvPr>

</xml_diff>

<commit_message>
Presentation de Git version3
</commit_message>
<xml_diff>
--- a/Pres-Git.pptx
+++ b/Pres-Git.pptx
@@ -8135,14 +8135,34 @@
           <a:p>
             <a:pPr algn="ctr"/>
             <a:r>
-              <a:rPr lang="fr-FR" sz="2000" b="1" smtClean="0">
-                <a:solidFill>
-                  <a:schemeClr val="dk1"/>
-                </a:solidFill>
-                <a:latin typeface="MV Boli" panose="02000500030200090000" pitchFamily="2" charset="0"/>
-                <a:cs typeface="MV Boli" panose="02000500030200090000" pitchFamily="2" charset="0"/>
-              </a:rPr>
-              <a:t>Hello Salhi</a:t>
+              <a:rPr lang="fr-FR" sz="2000" b="1" dirty="0" smtClean="0">
+                <a:solidFill>
+                  <a:schemeClr val="dk1"/>
+                </a:solidFill>
+                <a:latin typeface="MV Boli" panose="02000500030200090000" pitchFamily="2" charset="0"/>
+                <a:cs typeface="MV Boli" panose="02000500030200090000" pitchFamily="2" charset="0"/>
+              </a:rPr>
+              <a:t>BY</a:t>
+            </a:r>
+            <a:r>
+              <a:rPr lang="fr-FR" sz="2000" b="1" dirty="0" smtClean="0">
+                <a:solidFill>
+                  <a:schemeClr val="dk1"/>
+                </a:solidFill>
+                <a:latin typeface="MV Boli" panose="02000500030200090000" pitchFamily="2" charset="0"/>
+                <a:cs typeface="MV Boli" panose="02000500030200090000" pitchFamily="2" charset="0"/>
+              </a:rPr>
+              <a:t> </a:t>
+            </a:r>
+            <a:r>
+              <a:rPr lang="fr-FR" sz="2000" b="1" dirty="0" err="1" smtClean="0">
+                <a:solidFill>
+                  <a:schemeClr val="dk1"/>
+                </a:solidFill>
+                <a:latin typeface="MV Boli" panose="02000500030200090000" pitchFamily="2" charset="0"/>
+                <a:cs typeface="MV Boli" panose="02000500030200090000" pitchFamily="2" charset="0"/>
+              </a:rPr>
+              <a:t>Salhi</a:t>
             </a:r>
             <a:r>
               <a:rPr lang="fr-FR" sz="2000" b="1" dirty="0" smtClean="0">
@@ -9275,7 +9295,7 @@
           <p:cNvPr id="74" name="TextBox 15">
             <a:extLst>
               <a:ext uri="{FF2B5EF4-FFF2-40B4-BE49-F238E27FC236}">
-                <a16:creationId xmlns:a16="http://schemas.microsoft.com/office/drawing/2014/main" xmlns="" id="{8C4C6669-C30C-4DF4-A970-B262BF22AC28}"/>
+                <a16:creationId xmlns="" xmlns:a16="http://schemas.microsoft.com/office/drawing/2014/main" id="{8C4C6669-C30C-4DF4-A970-B262BF22AC28}"/>
               </a:ext>
             </a:extLst>
           </p:cNvPr>
@@ -10228,7 +10248,7 @@
           <p:cNvPr id="74" name="TextBox 15">
             <a:extLst>
               <a:ext uri="{FF2B5EF4-FFF2-40B4-BE49-F238E27FC236}">
-                <a16:creationId xmlns:a16="http://schemas.microsoft.com/office/drawing/2014/main" xmlns="" id="{8C4C6669-C30C-4DF4-A970-B262BF22AC28}"/>
+                <a16:creationId xmlns="" xmlns:a16="http://schemas.microsoft.com/office/drawing/2014/main" id="{8C4C6669-C30C-4DF4-A970-B262BF22AC28}"/>
               </a:ext>
             </a:extLst>
           </p:cNvPr>
@@ -11059,7 +11079,7 @@
           <p:cNvPr id="74" name="TextBox 15">
             <a:extLst>
               <a:ext uri="{FF2B5EF4-FFF2-40B4-BE49-F238E27FC236}">
-                <a16:creationId xmlns:a16="http://schemas.microsoft.com/office/drawing/2014/main" xmlns="" id="{8C4C6669-C30C-4DF4-A970-B262BF22AC28}"/>
+                <a16:creationId xmlns="" xmlns:a16="http://schemas.microsoft.com/office/drawing/2014/main" id="{8C4C6669-C30C-4DF4-A970-B262BF22AC28}"/>
               </a:ext>
             </a:extLst>
           </p:cNvPr>
@@ -13893,7 +13913,7 @@
           <p:cNvPr id="74" name="TextBox 15">
             <a:extLst>
               <a:ext uri="{FF2B5EF4-FFF2-40B4-BE49-F238E27FC236}">
-                <a16:creationId xmlns:a16="http://schemas.microsoft.com/office/drawing/2014/main" xmlns="" id="{8C4C6669-C30C-4DF4-A970-B262BF22AC28}"/>
+                <a16:creationId xmlns="" xmlns:a16="http://schemas.microsoft.com/office/drawing/2014/main" id="{8C4C6669-C30C-4DF4-A970-B262BF22AC28}"/>
               </a:ext>
             </a:extLst>
           </p:cNvPr>
@@ -17724,7 +17744,7 @@
           <p:cNvPr id="74" name="TextBox 15">
             <a:extLst>
               <a:ext uri="{FF2B5EF4-FFF2-40B4-BE49-F238E27FC236}">
-                <a16:creationId xmlns:a16="http://schemas.microsoft.com/office/drawing/2014/main" xmlns="" id="{8C4C6669-C30C-4DF4-A970-B262BF22AC28}"/>
+                <a16:creationId xmlns="" xmlns:a16="http://schemas.microsoft.com/office/drawing/2014/main" id="{8C4C6669-C30C-4DF4-A970-B262BF22AC28}"/>
               </a:ext>
             </a:extLst>
           </p:cNvPr>
@@ -18501,7 +18521,7 @@
           <p:cNvPr id="74" name="TextBox 15">
             <a:extLst>
               <a:ext uri="{FF2B5EF4-FFF2-40B4-BE49-F238E27FC236}">
-                <a16:creationId xmlns:a16="http://schemas.microsoft.com/office/drawing/2014/main" xmlns="" id="{8C4C6669-C30C-4DF4-A970-B262BF22AC28}"/>
+                <a16:creationId xmlns="" xmlns:a16="http://schemas.microsoft.com/office/drawing/2014/main" id="{8C4C6669-C30C-4DF4-A970-B262BF22AC28}"/>
               </a:ext>
             </a:extLst>
           </p:cNvPr>
@@ -19679,7 +19699,7 @@
           <p:cNvPr id="74" name="TextBox 15">
             <a:extLst>
               <a:ext uri="{FF2B5EF4-FFF2-40B4-BE49-F238E27FC236}">
-                <a16:creationId xmlns:a16="http://schemas.microsoft.com/office/drawing/2014/main" xmlns="" id="{8C4C6669-C30C-4DF4-A970-B262BF22AC28}"/>
+                <a16:creationId xmlns="" xmlns:a16="http://schemas.microsoft.com/office/drawing/2014/main" id="{8C4C6669-C30C-4DF4-A970-B262BF22AC28}"/>
               </a:ext>
             </a:extLst>
           </p:cNvPr>
@@ -20238,7 +20258,7 @@
           <p:cNvPr id="74" name="TextBox 15">
             <a:extLst>
               <a:ext uri="{FF2B5EF4-FFF2-40B4-BE49-F238E27FC236}">
-                <a16:creationId xmlns:a16="http://schemas.microsoft.com/office/drawing/2014/main" xmlns="" id="{8C4C6669-C30C-4DF4-A970-B262BF22AC28}"/>
+                <a16:creationId xmlns="" xmlns:a16="http://schemas.microsoft.com/office/drawing/2014/main" id="{8C4C6669-C30C-4DF4-A970-B262BF22AC28}"/>
               </a:ext>
             </a:extLst>
           </p:cNvPr>
@@ -21592,7 +21612,7 @@
           <p:cNvPr id="74" name="TextBox 15">
             <a:extLst>
               <a:ext uri="{FF2B5EF4-FFF2-40B4-BE49-F238E27FC236}">
-                <a16:creationId xmlns:a16="http://schemas.microsoft.com/office/drawing/2014/main" xmlns="" id="{8C4C6669-C30C-4DF4-A970-B262BF22AC28}"/>
+                <a16:creationId xmlns="" xmlns:a16="http://schemas.microsoft.com/office/drawing/2014/main" id="{8C4C6669-C30C-4DF4-A970-B262BF22AC28}"/>
               </a:ext>
             </a:extLst>
           </p:cNvPr>
@@ -23090,7 +23110,7 @@
           <p:cNvPr id="74" name="TextBox 15">
             <a:extLst>
               <a:ext uri="{FF2B5EF4-FFF2-40B4-BE49-F238E27FC236}">
-                <a16:creationId xmlns:a16="http://schemas.microsoft.com/office/drawing/2014/main" xmlns="" id="{8C4C6669-C30C-4DF4-A970-B262BF22AC28}"/>
+                <a16:creationId xmlns="" xmlns:a16="http://schemas.microsoft.com/office/drawing/2014/main" id="{8C4C6669-C30C-4DF4-A970-B262BF22AC28}"/>
               </a:ext>
             </a:extLst>
           </p:cNvPr>
@@ -23650,7 +23670,7 @@
           <p:cNvPr id="74" name="TextBox 15">
             <a:extLst>
               <a:ext uri="{FF2B5EF4-FFF2-40B4-BE49-F238E27FC236}">
-                <a16:creationId xmlns:a16="http://schemas.microsoft.com/office/drawing/2014/main" xmlns="" id="{8C4C6669-C30C-4DF4-A970-B262BF22AC28}"/>
+                <a16:creationId xmlns="" xmlns:a16="http://schemas.microsoft.com/office/drawing/2014/main" id="{8C4C6669-C30C-4DF4-A970-B262BF22AC28}"/>
               </a:ext>
             </a:extLst>
           </p:cNvPr>

</xml_diff>